<commit_message>
removed demo script from m2 & added to m1
</commit_message>
<xml_diff>
--- a/02.Setting up the Environments/02.Setting up the Environments.pptx
+++ b/02.Setting up the Environments/02.Setting up the Environments.pptx
@@ -145,7 +145,7 @@
   </p:defaultTextStyle>
   <p:extLst>
     <p:ext uri="{EFAFB233-063F-42B5-8137-9DF3F51BA10A}">
-      <p15:sldGuideLst xmlns:p15="http://schemas.microsoft.com/office/powerpoint/2012/main">
+      <p15:sldGuideLst xmlns:p15="http://schemas.microsoft.com/office/powerpoint/2012/main" xmlns="">
         <p15:guide id="1" orient="horz" pos="142">
           <p15:clr>
             <a:srgbClr val="A4A3A4"/>
@@ -244,7 +244,7 @@
       </p15:sldGuideLst>
     </p:ext>
     <p:ext uri="{2D200454-40CA-4A62-9FC3-DE9A4176ACB9}">
-      <p15:notesGuideLst xmlns:p15="http://schemas.microsoft.com/office/powerpoint/2012/main">
+      <p15:notesGuideLst xmlns:p15="http://schemas.microsoft.com/office/powerpoint/2012/main" xmlns="">
         <p15:guide id="1" orient="horz" pos="2880">
           <p15:clr>
             <a:srgbClr val="A4A3A4"/>
@@ -347,7 +347,7 @@
           <a:p>
             <a:fld id="{DE219B1A-AE41-483B-A766-69B9363DDA6A}" type="datetimeFigureOut">
               <a:rPr lang="en-US" smtClean="0"/>
-              <a:t>8/27/2014</a:t>
+              <a:t>9/9/14</a:t>
             </a:fld>
             <a:endParaRPr lang="en-US"/>
           </a:p>
@@ -629,7 +629,7 @@
           <a:p>
             <a:fld id="{D51B1278-D92B-4AF3-A9C1-71DD298190CE}" type="datetimeFigureOut">
               <a:rPr lang="en-US" smtClean="0"/>
-              <a:t>8/27/2014</a:t>
+              <a:t>9/9/14</a:t>
             </a:fld>
             <a:endParaRPr lang="en-US"/>
           </a:p>
@@ -1224,7 +1224,7 @@
           <a:p>
             <a:fld id="{4F0210BE-2A39-4D0E-9359-F64D4B884D4E}" type="datetime1">
               <a:rPr lang="en-US" smtClean="0"/>
-              <a:t>8/27/2014</a:t>
+              <a:t>9/9/14</a:t>
             </a:fld>
             <a:endParaRPr lang="en-US"/>
           </a:p>
@@ -1434,7 +1434,7 @@
           <a:p>
             <a:fld id="{CA454356-7988-4E39-B534-EC35F7CCC11C}" type="datetime1">
               <a:rPr lang="en-US" smtClean="0"/>
-              <a:t>8/27/2014</a:t>
+              <a:t>9/9/14</a:t>
             </a:fld>
             <a:endParaRPr lang="en-US"/>
           </a:p>
@@ -1640,7 +1640,7 @@
           <a:p>
             <a:fld id="{1B816852-F550-4F1E-AE22-5580BB5390CD}" type="datetime1">
               <a:rPr lang="en-US" smtClean="0"/>
-              <a:t>8/27/2014</a:t>
+              <a:t>9/9/14</a:t>
             </a:fld>
             <a:endParaRPr lang="en-US"/>
           </a:p>
@@ -1850,7 +1850,7 @@
           <a:p>
             <a:fld id="{8C3D3F17-9065-4B2A-80EA-09A3A0159250}" type="datetime1">
               <a:rPr lang="en-US" smtClean="0"/>
-              <a:t>8/27/2014</a:t>
+              <a:t>9/9/14</a:t>
             </a:fld>
             <a:endParaRPr lang="en-US"/>
           </a:p>
@@ -2167,7 +2167,7 @@
           <a:p>
             <a:fld id="{E94FB22D-AF06-49F0-ABFB-4A3B32E04FBE}" type="datetime1">
               <a:rPr lang="en-US" smtClean="0"/>
-              <a:t>8/27/2014</a:t>
+              <a:t>9/9/14</a:t>
             </a:fld>
             <a:endParaRPr lang="en-US"/>
           </a:p>
@@ -2274,7 +2274,7 @@
           <a:p>
             <a:fld id="{35A2105E-80AA-4B38-BA9C-D7E35197D8BA}" type="datetime1">
               <a:rPr lang="en-US" smtClean="0"/>
-              <a:t>8/27/2014</a:t>
+              <a:t>9/9/14</a:t>
             </a:fld>
             <a:endParaRPr lang="en-US"/>
           </a:p>
@@ -2480,7 +2480,7 @@
           <a:p>
             <a:fld id="{C5A2A3EB-BE87-4080-97A4-5341D2051EE4}" type="datetime1">
               <a:rPr lang="en-US" smtClean="0"/>
-              <a:t>8/27/2014</a:t>
+              <a:t>9/9/14</a:t>
             </a:fld>
             <a:endParaRPr lang="en-US"/>
           </a:p>
@@ -2837,7 +2837,7 @@
           <a:p>
             <a:fld id="{B079C3B8-7366-4A44-A34B-3977080C19E7}" type="datetime1">
               <a:rPr lang="en-US" smtClean="0"/>
-              <a:t>8/27/2014</a:t>
+              <a:t>9/9/14</a:t>
             </a:fld>
             <a:endParaRPr lang="en-US" dirty="0"/>
           </a:p>
@@ -3079,7 +3079,7 @@
           <a:p>
             <a:fld id="{0BB6559B-C68D-49B4-97AE-9BB74C417927}" type="datetime1">
               <a:rPr lang="en-US" smtClean="0"/>
-              <a:t>8/27/2014</a:t>
+              <a:t>9/9/14</a:t>
             </a:fld>
             <a:endParaRPr lang="en-US"/>
           </a:p>
@@ -3337,7 +3337,7 @@
           <a:p>
             <a:fld id="{B079C3B8-7366-4A44-A34B-3977080C19E7}" type="datetime1">
               <a:rPr lang="en-US" smtClean="0"/>
-              <a:t>8/27/2014</a:t>
+              <a:t>9/9/14</a:t>
             </a:fld>
             <a:endParaRPr lang="en-US" dirty="0"/>
           </a:p>
@@ -3468,7 +3468,7 @@
           <a:p>
             <a:fld id="{9A443B04-064F-4871-9D9F-BDCA414B0371}" type="datetime1">
               <a:rPr lang="en-US" smtClean="0"/>
-              <a:t>8/27/2014</a:t>
+              <a:t>9/9/14</a:t>
             </a:fld>
             <a:endParaRPr lang="en-US"/>
           </a:p>
@@ -3705,7 +3705,7 @@
           <a:p>
             <a:fld id="{7017412A-FAE9-499A-B3C7-924D02AB998D}" type="datetime1">
               <a:rPr lang="en-US" smtClean="0"/>
-              <a:t>8/27/2014</a:t>
+              <a:t>9/9/14</a:t>
             </a:fld>
             <a:endParaRPr lang="en-US"/>
           </a:p>
@@ -3917,7 +3917,7 @@
           <a:p>
             <a:fld id="{4692986F-2699-409F-8A21-4F1A3E24BE62}" type="datetime1">
               <a:rPr lang="en-US" smtClean="0"/>
-              <a:t>8/27/2014</a:t>
+              <a:t>9/9/14</a:t>
             </a:fld>
             <a:endParaRPr lang="en-US"/>
           </a:p>
@@ -4149,7 +4149,7 @@
           <a:p>
             <a:fld id="{EC07A5DE-1429-409E-95F7-F13CDA16C6E2}" type="datetime1">
               <a:rPr lang="en-US" smtClean="0"/>
-              <a:t>8/27/2014</a:t>
+              <a:t>9/9/14</a:t>
             </a:fld>
             <a:endParaRPr lang="en-US"/>
           </a:p>
@@ -4373,7 +4373,7 @@
           <a:p>
             <a:fld id="{BBA7F52A-B8F7-43B0-8B42-741D53CB577A}" type="datetime1">
               <a:rPr lang="en-US" smtClean="0"/>
-              <a:t>8/27/2014</a:t>
+              <a:t>9/9/14</a:t>
             </a:fld>
             <a:endParaRPr lang="en-US"/>
           </a:p>
@@ -4589,7 +4589,7 @@
           <a:p>
             <a:fld id="{4B1490A0-601F-404D-B7DA-4F4F3A8C8BB1}" type="datetime1">
               <a:rPr lang="en-US" smtClean="0"/>
-              <a:t>8/27/2014</a:t>
+              <a:t>9/9/14</a:t>
             </a:fld>
             <a:endParaRPr lang="en-US"/>
           </a:p>
@@ -5406,7 +5406,7 @@
   <p:timing>
     <p:tnLst>
       <p:par>
-        <p:cTn id="1" dur="indefinite" restart="never" nodeType="tmRoot"/>
+        <p:cTn xmlns:p14="http://schemas.microsoft.com/office/powerpoint/2010/main" id="1" dur="indefinite" restart="never" nodeType="tmRoot"/>
       </p:par>
     </p:tnLst>
   </p:timing>
@@ -5749,7 +5749,7 @@
   <p:timing>
     <p:tnLst>
       <p:par>
-        <p:cTn id="1" dur="indefinite" restart="never" nodeType="tmRoot"/>
+        <p:cTn xmlns:p14="http://schemas.microsoft.com/office/powerpoint/2010/main" id="1" dur="indefinite" restart="never" nodeType="tmRoot"/>
       </p:par>
     </p:tnLst>
   </p:timing>
@@ -6097,7 +6097,7 @@
   <p:timing>
     <p:tnLst>
       <p:par>
-        <p:cTn id="1" dur="indefinite" restart="never" nodeType="tmRoot"/>
+        <p:cTn xmlns:p14="http://schemas.microsoft.com/office/powerpoint/2010/main" id="1" dur="indefinite" restart="never" nodeType="tmRoot"/>
       </p:par>
     </p:tnLst>
   </p:timing>
@@ -6397,7 +6397,7 @@
   <p:timing>
     <p:tnLst>
       <p:par>
-        <p:cTn id="1" dur="indefinite" restart="never" nodeType="tmRoot"/>
+        <p:cTn xmlns:p14="http://schemas.microsoft.com/office/powerpoint/2010/main" id="1" dur="indefinite" restart="never" nodeType="tmRoot"/>
       </p:par>
     </p:tnLst>
   </p:timing>
@@ -6736,7 +6736,7 @@
   <p:timing>
     <p:tnLst>
       <p:par>
-        <p:cTn id="1" dur="indefinite" restart="never" nodeType="tmRoot"/>
+        <p:cTn xmlns:p14="http://schemas.microsoft.com/office/powerpoint/2010/main" id="1" dur="indefinite" restart="never" nodeType="tmRoot"/>
       </p:par>
     </p:tnLst>
   </p:timing>
@@ -7109,7 +7109,7 @@
   <p:timing>
     <p:tnLst>
       <p:par>
-        <p:cTn id="1" dur="indefinite" restart="never" nodeType="tmRoot"/>
+        <p:cTn xmlns:p14="http://schemas.microsoft.com/office/powerpoint/2010/main" id="1" dur="indefinite" restart="never" nodeType="tmRoot"/>
       </p:par>
     </p:tnLst>
   </p:timing>
@@ -7482,7 +7482,7 @@
   <p:timing>
     <p:tnLst>
       <p:par>
-        <p:cTn id="1" dur="indefinite" restart="never" nodeType="tmRoot"/>
+        <p:cTn xmlns:p14="http://schemas.microsoft.com/office/powerpoint/2010/main" id="1" dur="indefinite" restart="never" nodeType="tmRoot"/>
       </p:par>
     </p:tnLst>
   </p:timing>
@@ -7938,7 +7938,7 @@
   <p:clrMapOvr>
     <a:masterClrMapping/>
   </p:clrMapOvr>
-  <p:transition>
+  <p:transition xmlns:p14="http://schemas.microsoft.com/office/powerpoint/2010/main">
     <p:fade/>
   </p:transition>
 </p:sldLayout>
@@ -7971,7 +7971,7 @@
   <p:clrMapOvr>
     <a:masterClrMapping/>
   </p:clrMapOvr>
-  <p:transition>
+  <p:transition xmlns:p14="http://schemas.microsoft.com/office/powerpoint/2010/main">
     <p:fade/>
   </p:transition>
 </p:sldLayout>
@@ -8279,7 +8279,7 @@
   <p:clrMapOvr>
     <a:masterClrMapping/>
   </p:clrMapOvr>
-  <p:transition>
+  <p:transition xmlns:p14="http://schemas.microsoft.com/office/powerpoint/2010/main">
     <p:fade/>
   </p:transition>
 </p:sldLayout>
@@ -8394,13 +8394,13 @@
   <p:clrMapOvr>
     <a:masterClrMapping/>
   </p:clrMapOvr>
-  <p:transition>
+  <p:transition xmlns:p14="http://schemas.microsoft.com/office/powerpoint/2010/main">
     <p:fade/>
   </p:transition>
   <p:timing>
     <p:tnLst>
       <p:par>
-        <p:cTn id="1" dur="indefinite" restart="never" nodeType="tmRoot"/>
+        <p:cTn xmlns:p14="http://schemas.microsoft.com/office/powerpoint/2010/main" id="1" dur="indefinite" restart="never" nodeType="tmRoot"/>
       </p:par>
     </p:tnLst>
   </p:timing>
@@ -8728,13 +8728,13 @@
   <p:clrMapOvr>
     <a:masterClrMapping/>
   </p:clrMapOvr>
-  <p:transition>
+  <p:transition xmlns:p14="http://schemas.microsoft.com/office/powerpoint/2010/main">
     <p:fade/>
   </p:transition>
   <p:timing>
     <p:tnLst>
       <p:par>
-        <p:cTn id="1" dur="indefinite" restart="never" nodeType="tmRoot"/>
+        <p:cTn xmlns:p14="http://schemas.microsoft.com/office/powerpoint/2010/main" id="1" dur="indefinite" restart="never" nodeType="tmRoot"/>
       </p:par>
     </p:tnLst>
   </p:timing>
@@ -9149,19 +9149,19 @@
   <p:clrMapOvr>
     <a:masterClrMapping/>
   </p:clrMapOvr>
-  <p:transition>
+  <p:transition xmlns:p14="http://schemas.microsoft.com/office/powerpoint/2010/main">
     <p:fade/>
   </p:transition>
   <p:timing>
     <p:tnLst>
       <p:par>
-        <p:cTn id="1" dur="indefinite" restart="never" nodeType="tmRoot"/>
+        <p:cTn xmlns:p14="http://schemas.microsoft.com/office/powerpoint/2010/main" id="1" dur="indefinite" restart="never" nodeType="tmRoot"/>
       </p:par>
     </p:tnLst>
   </p:timing>
   <p:extLst mod="1">
     <p:ext uri="{DCECCB84-F9BA-43D5-87BE-67443E8EF086}">
-      <p15:sldGuideLst xmlns:p15="http://schemas.microsoft.com/office/powerpoint/2012/main">
+      <p15:sldGuideLst xmlns:p15="http://schemas.microsoft.com/office/powerpoint/2012/main" xmlns="">
         <p15:guide id="1" orient="horz" pos="2203">
           <p15:clr>
             <a:srgbClr val="FBAE40"/>
@@ -9378,13 +9378,13 @@
   <p:clrMapOvr>
     <a:masterClrMapping/>
   </p:clrMapOvr>
-  <p:transition>
+  <p:transition xmlns:p14="http://schemas.microsoft.com/office/powerpoint/2010/main">
     <p:fade/>
   </p:transition>
   <p:timing>
     <p:tnLst>
       <p:par>
-        <p:cTn id="1" dur="indefinite" restart="never" nodeType="tmRoot"/>
+        <p:cTn xmlns:p14="http://schemas.microsoft.com/office/powerpoint/2010/main" id="1" dur="indefinite" restart="never" nodeType="tmRoot"/>
       </p:par>
     </p:tnLst>
   </p:timing>
@@ -9606,13 +9606,13 @@
   <p:clrMapOvr>
     <a:masterClrMapping/>
   </p:clrMapOvr>
-  <p:transition>
+  <p:transition xmlns:p14="http://schemas.microsoft.com/office/powerpoint/2010/main">
     <p:fade/>
   </p:transition>
   <p:timing>
     <p:tnLst>
       <p:par>
-        <p:cTn id="1" dur="indefinite" restart="never" nodeType="tmRoot"/>
+        <p:cTn xmlns:p14="http://schemas.microsoft.com/office/powerpoint/2010/main" id="1" dur="indefinite" restart="never" nodeType="tmRoot"/>
       </p:par>
     </p:tnLst>
   </p:timing>
@@ -9833,13 +9833,13 @@
   <p:clrMapOvr>
     <a:masterClrMapping/>
   </p:clrMapOvr>
-  <p:transition>
+  <p:transition xmlns:p14="http://schemas.microsoft.com/office/powerpoint/2010/main">
     <p:fade/>
   </p:transition>
   <p:timing>
     <p:tnLst>
       <p:par>
-        <p:cTn id="1" dur="indefinite" restart="never" nodeType="tmRoot"/>
+        <p:cTn xmlns:p14="http://schemas.microsoft.com/office/powerpoint/2010/main" id="1" dur="indefinite" restart="never" nodeType="tmRoot"/>
       </p:par>
     </p:tnLst>
   </p:timing>
@@ -10119,13 +10119,13 @@
   <p:clrMapOvr>
     <a:masterClrMapping/>
   </p:clrMapOvr>
-  <p:transition>
+  <p:transition xmlns:p14="http://schemas.microsoft.com/office/powerpoint/2010/main">
     <p:fade/>
   </p:transition>
   <p:timing>
     <p:tnLst>
       <p:par>
-        <p:cTn id="1" dur="indefinite" restart="never" nodeType="tmRoot"/>
+        <p:cTn xmlns:p14="http://schemas.microsoft.com/office/powerpoint/2010/main" id="1" dur="indefinite" restart="never" nodeType="tmRoot"/>
       </p:par>
     </p:tnLst>
   </p:timing>
@@ -10268,7 +10268,7 @@
   <p:timing>
     <p:tnLst>
       <p:par>
-        <p:cTn id="1" dur="indefinite" restart="never" nodeType="tmRoot"/>
+        <p:cTn xmlns:p14="http://schemas.microsoft.com/office/powerpoint/2010/main" id="1" dur="indefinite" restart="never" nodeType="tmRoot"/>
       </p:par>
     </p:tnLst>
   </p:timing>
@@ -10445,7 +10445,7 @@
   <p:timing>
     <p:tnLst>
       <p:par>
-        <p:cTn id="1" dur="indefinite" restart="never" nodeType="tmRoot"/>
+        <p:cTn xmlns:p14="http://schemas.microsoft.com/office/powerpoint/2010/main" id="1" dur="indefinite" restart="never" nodeType="tmRoot"/>
       </p:par>
     </p:tnLst>
   </p:timing>
@@ -10622,7 +10622,7 @@
   <p:timing>
     <p:tnLst>
       <p:par>
-        <p:cTn id="1" dur="indefinite" restart="never" nodeType="tmRoot"/>
+        <p:cTn xmlns:p14="http://schemas.microsoft.com/office/powerpoint/2010/main" id="1" dur="indefinite" restart="never" nodeType="tmRoot"/>
       </p:par>
     </p:tnLst>
   </p:timing>
@@ -10799,7 +10799,7 @@
   <p:timing>
     <p:tnLst>
       <p:par>
-        <p:cTn id="1" dur="indefinite" restart="never" nodeType="tmRoot"/>
+        <p:cTn xmlns:p14="http://schemas.microsoft.com/office/powerpoint/2010/main" id="1" dur="indefinite" restart="never" nodeType="tmRoot"/>
       </p:par>
     </p:tnLst>
   </p:timing>
@@ -11102,7 +11102,7 @@
   <p:timing>
     <p:tnLst>
       <p:par>
-        <p:cTn id="1" dur="indefinite" restart="never" nodeType="tmRoot"/>
+        <p:cTn xmlns:p14="http://schemas.microsoft.com/office/powerpoint/2010/main" id="1" dur="indefinite" restart="never" nodeType="tmRoot"/>
       </p:par>
     </p:tnLst>
   </p:timing>
@@ -11279,7 +11279,7 @@
   <p:timing>
     <p:tnLst>
       <p:par>
-        <p:cTn id="1" dur="indefinite" restart="never" nodeType="tmRoot"/>
+        <p:cTn xmlns:p14="http://schemas.microsoft.com/office/powerpoint/2010/main" id="1" dur="indefinite" restart="never" nodeType="tmRoot"/>
       </p:par>
     </p:tnLst>
   </p:timing>
@@ -11398,13 +11398,13 @@
   <p:clrMapOvr>
     <a:masterClrMapping/>
   </p:clrMapOvr>
-  <p:transition>
+  <p:transition xmlns:p14="http://schemas.microsoft.com/office/powerpoint/2010/main">
     <p:fade/>
   </p:transition>
   <p:timing>
     <p:tnLst>
       <p:par>
-        <p:cTn id="1" dur="indefinite" restart="never" nodeType="tmRoot"/>
+        <p:cTn xmlns:p14="http://schemas.microsoft.com/office/powerpoint/2010/main" id="1" dur="indefinite" restart="never" nodeType="tmRoot"/>
       </p:par>
     </p:tnLst>
   </p:timing>
@@ -11523,13 +11523,13 @@
   <p:clrMapOvr>
     <a:masterClrMapping/>
   </p:clrMapOvr>
-  <p:transition>
+  <p:transition xmlns:p14="http://schemas.microsoft.com/office/powerpoint/2010/main">
     <p:fade/>
   </p:transition>
   <p:timing>
     <p:tnLst>
       <p:par>
-        <p:cTn id="1" dur="indefinite" restart="never" nodeType="tmRoot"/>
+        <p:cTn xmlns:p14="http://schemas.microsoft.com/office/powerpoint/2010/main" id="1" dur="indefinite" restart="never" nodeType="tmRoot"/>
       </p:par>
     </p:tnLst>
   </p:timing>
@@ -11648,13 +11648,13 @@
   <p:clrMapOvr>
     <a:masterClrMapping/>
   </p:clrMapOvr>
-  <p:transition>
+  <p:transition xmlns:p14="http://schemas.microsoft.com/office/powerpoint/2010/main">
     <p:fade/>
   </p:transition>
   <p:timing>
     <p:tnLst>
       <p:par>
-        <p:cTn id="1" dur="indefinite" restart="never" nodeType="tmRoot"/>
+        <p:cTn xmlns:p14="http://schemas.microsoft.com/office/powerpoint/2010/main" id="1" dur="indefinite" restart="never" nodeType="tmRoot"/>
       </p:par>
     </p:tnLst>
   </p:timing>
@@ -11773,13 +11773,13 @@
   <p:clrMapOvr>
     <a:masterClrMapping/>
   </p:clrMapOvr>
-  <p:transition>
+  <p:transition xmlns:p14="http://schemas.microsoft.com/office/powerpoint/2010/main">
     <p:fade/>
   </p:transition>
   <p:timing>
     <p:tnLst>
       <p:par>
-        <p:cTn id="1" dur="indefinite" restart="never" nodeType="tmRoot"/>
+        <p:cTn xmlns:p14="http://schemas.microsoft.com/office/powerpoint/2010/main" id="1" dur="indefinite" restart="never" nodeType="tmRoot"/>
       </p:par>
     </p:tnLst>
   </p:timing>
@@ -11821,7 +11821,7 @@
   <p:clrMapOvr>
     <a:masterClrMapping/>
   </p:clrMapOvr>
-  <p:transition>
+  <p:transition xmlns:p14="http://schemas.microsoft.com/office/powerpoint/2010/main">
     <p:fade/>
   </p:transition>
 </p:sldLayout>
@@ -11862,7 +11862,7 @@
   <p:clrMapOvr>
     <a:masterClrMapping/>
   </p:clrMapOvr>
-  <p:transition>
+  <p:transition xmlns:p14="http://schemas.microsoft.com/office/powerpoint/2010/main">
     <p:fade/>
   </p:transition>
 </p:sldLayout>
@@ -11903,7 +11903,7 @@
   <p:clrMapOvr>
     <a:masterClrMapping/>
   </p:clrMapOvr>
-  <p:transition>
+  <p:transition xmlns:p14="http://schemas.microsoft.com/office/powerpoint/2010/main">
     <p:fade/>
   </p:transition>
 </p:sldLayout>
@@ -11944,7 +11944,7 @@
   <p:clrMapOvr>
     <a:masterClrMapping/>
   </p:clrMapOvr>
-  <p:transition>
+  <p:transition xmlns:p14="http://schemas.microsoft.com/office/powerpoint/2010/main">
     <p:fade/>
   </p:transition>
 </p:sldLayout>
@@ -12239,13 +12239,13 @@
   <p:clrMapOvr>
     <a:masterClrMapping/>
   </p:clrMapOvr>
-  <p:transition>
+  <p:transition xmlns:p14="http://schemas.microsoft.com/office/powerpoint/2010/main">
     <p:fade/>
   </p:transition>
   <p:timing>
     <p:tnLst>
       <p:par>
-        <p:cTn id="1" dur="indefinite" restart="never" nodeType="tmRoot"/>
+        <p:cTn xmlns:p14="http://schemas.microsoft.com/office/powerpoint/2010/main" id="1" dur="indefinite" restart="never" nodeType="tmRoot"/>
       </p:par>
     </p:tnLst>
   </p:timing>
@@ -12541,13 +12541,13 @@
   <p:clrMapOvr>
     <a:masterClrMapping/>
   </p:clrMapOvr>
-  <p:transition>
+  <p:transition xmlns:p14="http://schemas.microsoft.com/office/powerpoint/2010/main">
     <p:fade/>
   </p:transition>
   <p:timing>
     <p:tnLst>
       <p:par>
-        <p:cTn id="1" dur="indefinite" restart="never" nodeType="tmRoot"/>
+        <p:cTn xmlns:p14="http://schemas.microsoft.com/office/powerpoint/2010/main" id="1" dur="indefinite" restart="never" nodeType="tmRoot"/>
       </p:par>
     </p:tnLst>
   </p:timing>
@@ -12799,13 +12799,13 @@
   <p:clrMapOvr>
     <a:masterClrMapping/>
   </p:clrMapOvr>
-  <p:transition>
+  <p:transition xmlns:p14="http://schemas.microsoft.com/office/powerpoint/2010/main">
     <p:fade/>
   </p:transition>
   <p:timing>
     <p:tnLst>
       <p:par>
-        <p:cTn id="1" dur="indefinite" restart="never" nodeType="tmRoot"/>
+        <p:cTn xmlns:p14="http://schemas.microsoft.com/office/powerpoint/2010/main" id="1" dur="indefinite" restart="never" nodeType="tmRoot"/>
       </p:par>
     </p:tnLst>
   </p:timing>
@@ -13333,13 +13333,13 @@
   <p:clrMapOvr>
     <a:masterClrMapping/>
   </p:clrMapOvr>
-  <p:transition>
+  <p:transition xmlns:p14="http://schemas.microsoft.com/office/powerpoint/2010/main">
     <p:fade/>
   </p:transition>
   <p:timing>
     <p:tnLst>
       <p:par>
-        <p:cTn id="1" dur="indefinite" restart="never" nodeType="tmRoot"/>
+        <p:cTn xmlns:p14="http://schemas.microsoft.com/office/powerpoint/2010/main" id="1" dur="indefinite" restart="never" nodeType="tmRoot"/>
       </p:par>
     </p:tnLst>
   </p:timing>
@@ -13915,7 +13915,7 @@
   <p:clrMapOvr>
     <a:masterClrMapping/>
   </p:clrMapOvr>
-  <p:transition>
+  <p:transition xmlns:p14="http://schemas.microsoft.com/office/powerpoint/2010/main">
     <p:fade/>
   </p:transition>
 </p:sldLayout>
@@ -14409,7 +14409,7 @@
   <p:clrMapOvr>
     <a:masterClrMapping/>
   </p:clrMapOvr>
-  <p:transition>
+  <p:transition xmlns:p14="http://schemas.microsoft.com/office/powerpoint/2010/main">
     <p:fade/>
   </p:transition>
 </p:sldLayout>
@@ -14568,13 +14568,13 @@
     <p:sldLayoutId id="2147484151" r:id="rId25"/>
     <p:sldLayoutId id="2147484152" r:id="rId26"/>
   </p:sldLayoutIdLst>
-  <p:transition>
+  <p:transition xmlns:p14="http://schemas.microsoft.com/office/powerpoint/2010/main">
     <p:fade/>
   </p:transition>
   <p:timing>
     <p:tnLst>
       <p:par>
-        <p:cTn id="1" dur="indefinite" restart="never" nodeType="tmRoot"/>
+        <p:cTn xmlns:p14="http://schemas.microsoft.com/office/powerpoint/2010/main" id="1" dur="indefinite" restart="never" nodeType="tmRoot"/>
       </p:par>
     </p:tnLst>
   </p:timing>
@@ -14980,13 +14980,13 @@
     <p:sldLayoutId id="2147484066" r:id="rId11"/>
     <p:sldLayoutId id="2147484098" r:id="rId12"/>
   </p:sldLayoutIdLst>
-  <p:transition>
+  <p:transition xmlns:p14="http://schemas.microsoft.com/office/powerpoint/2010/main">
     <p:fade/>
   </p:transition>
   <p:timing>
     <p:tnLst>
       <p:par>
-        <p:cTn id="1" dur="indefinite" restart="never" nodeType="tmRoot"/>
+        <p:cTn xmlns:p14="http://schemas.microsoft.com/office/powerpoint/2010/main" id="1" dur="indefinite" restart="never" nodeType="tmRoot"/>
       </p:par>
     </p:tnLst>
   </p:timing>
@@ -15440,7 +15440,7 @@
   <p:timing>
     <p:tnLst>
       <p:par>
-        <p:cTn id="1" dur="indefinite" restart="never" nodeType="tmRoot"/>
+        <p:cTn xmlns:p14="http://schemas.microsoft.com/office/powerpoint/2010/main" id="1" dur="indefinite" restart="never" nodeType="tmRoot"/>
       </p:par>
     </p:tnLst>
   </p:timing>
@@ -15448,7 +15448,7 @@
 </file>
 
 <file path=ppt/slides/slide10.xml><?xml version="1.0" encoding="utf-8"?>
-<p:sld xmlns:a="http://schemas.openxmlformats.org/drawingml/2006/main" xmlns:r="http://schemas.openxmlformats.org/officeDocument/2006/relationships" xmlns:p="http://schemas.openxmlformats.org/presentationml/2006/main">
+<p:sld xmlns:a="http://schemas.openxmlformats.org/drawingml/2006/main" xmlns:r="http://schemas.openxmlformats.org/officeDocument/2006/relationships" xmlns:p="http://schemas.openxmlformats.org/presentationml/2006/main" show="0">
   <p:cSld>
     <p:spTree>
       <p:nvGrpSpPr>
@@ -15523,13 +15523,13 @@
   <p:clrMapOvr>
     <a:masterClrMapping/>
   </p:clrMapOvr>
-  <p:transition>
+  <p:transition xmlns:p14="http://schemas.microsoft.com/office/powerpoint/2010/main">
     <p:fade/>
   </p:transition>
   <p:timing>
     <p:tnLst>
       <p:par>
-        <p:cTn id="1" dur="indefinite" restart="never" nodeType="tmRoot"/>
+        <p:cTn xmlns:p14="http://schemas.microsoft.com/office/powerpoint/2010/main" id="1" dur="indefinite" restart="never" nodeType="tmRoot"/>
       </p:par>
     </p:tnLst>
   </p:timing>
@@ -15606,13 +15606,13 @@
   <p:clrMapOvr>
     <a:masterClrMapping/>
   </p:clrMapOvr>
-  <p:transition>
+  <p:transition xmlns:p14="http://schemas.microsoft.com/office/powerpoint/2010/main">
     <p:fade/>
   </p:transition>
   <p:timing>
     <p:tnLst>
       <p:par>
-        <p:cTn id="1" dur="indefinite" restart="never" nodeType="tmRoot"/>
+        <p:cTn xmlns:p14="http://schemas.microsoft.com/office/powerpoint/2010/main" id="1" dur="indefinite" restart="never" nodeType="tmRoot"/>
       </p:par>
     </p:tnLst>
   </p:timing>
@@ -15752,7 +15752,7 @@
   <p:clrMapOvr>
     <a:masterClrMapping/>
   </p:clrMapOvr>
-  <p:transition>
+  <p:transition xmlns:p14="http://schemas.microsoft.com/office/powerpoint/2010/main">
     <p:fade/>
   </p:transition>
 </p:sld>
@@ -15907,7 +15907,7 @@
   <p:clrMapOvr>
     <a:masterClrMapping/>
   </p:clrMapOvr>
-  <p:transition>
+  <p:transition xmlns:p14="http://schemas.microsoft.com/office/powerpoint/2010/main">
     <p:fade/>
   </p:transition>
 </p:sld>
@@ -16045,14 +16045,14 @@
   <p:clrMapOvr>
     <a:masterClrMapping/>
   </p:clrMapOvr>
-  <p:transition>
+  <p:transition xmlns:p14="http://schemas.microsoft.com/office/powerpoint/2010/main">
     <p:fade/>
   </p:transition>
 </p:sld>
 </file>
 
 <file path=ppt/slides/slide15.xml><?xml version="1.0" encoding="utf-8"?>
-<p:sld xmlns:a="http://schemas.openxmlformats.org/drawingml/2006/main" xmlns:r="http://schemas.openxmlformats.org/officeDocument/2006/relationships" xmlns:p="http://schemas.openxmlformats.org/presentationml/2006/main">
+<p:sld xmlns:a="http://schemas.openxmlformats.org/drawingml/2006/main" xmlns:r="http://schemas.openxmlformats.org/officeDocument/2006/relationships" xmlns:p="http://schemas.openxmlformats.org/presentationml/2006/main" show="0">
   <p:cSld>
     <p:spTree>
       <p:nvGrpSpPr>
@@ -16127,13 +16127,13 @@
   <p:clrMapOvr>
     <a:masterClrMapping/>
   </p:clrMapOvr>
-  <p:transition>
+  <p:transition xmlns:p14="http://schemas.microsoft.com/office/powerpoint/2010/main">
     <p:fade/>
   </p:transition>
   <p:timing>
     <p:tnLst>
       <p:par>
-        <p:cTn id="1" dur="indefinite" restart="never" nodeType="tmRoot"/>
+        <p:cTn xmlns:p14="http://schemas.microsoft.com/office/powerpoint/2010/main" id="1" dur="indefinite" restart="never" nodeType="tmRoot"/>
       </p:par>
     </p:tnLst>
   </p:timing>
@@ -16210,13 +16210,13 @@
   <p:clrMapOvr>
     <a:masterClrMapping/>
   </p:clrMapOvr>
-  <p:transition>
+  <p:transition xmlns:p14="http://schemas.microsoft.com/office/powerpoint/2010/main">
     <p:fade/>
   </p:transition>
   <p:timing>
     <p:tnLst>
       <p:par>
-        <p:cTn id="1" dur="indefinite" restart="never" nodeType="tmRoot"/>
+        <p:cTn xmlns:p14="http://schemas.microsoft.com/office/powerpoint/2010/main" id="1" dur="indefinite" restart="never" nodeType="tmRoot"/>
       </p:par>
     </p:tnLst>
   </p:timing>
@@ -19434,7 +19434,7 @@
               </a:ln>
               <a:extLst>
                 <a:ext uri="{91240B29-F687-4f45-9708-019B960494DF}">
-                  <a14:hiddenLine xmlns="" xmlns:a14="http://schemas.microsoft.com/office/drawing/2010/main" w="9525">
+                  <a14:hiddenLine xmlns:a14="http://schemas.microsoft.com/office/drawing/2010/main" w="9525">
                     <a:solidFill>
                       <a:srgbClr val="000000"/>
                     </a:solidFill>
@@ -22239,7 +22239,7 @@
                 </a:ln>
                 <a:extLst>
                   <a:ext uri="{91240B29-F687-4f45-9708-019B960494DF}">
-                    <a14:hiddenLine xmlns:a14="http://schemas.microsoft.com/office/drawing/2010/main" xmlns="" w="9525">
+                    <a14:hiddenLine xmlns:a14="http://schemas.microsoft.com/office/drawing/2010/main" w="9525">
                       <a:solidFill>
                         <a:srgbClr val="000000"/>
                       </a:solidFill>
@@ -27277,7 +27277,7 @@
                 </a:ln>
                 <a:extLst>
                   <a:ext uri="{91240B29-F687-4f45-9708-019B960494DF}">
-                    <a14:hiddenLine xmlns:a14="http://schemas.microsoft.com/office/drawing/2010/main" xmlns="" w="9525">
+                    <a14:hiddenLine xmlns:a14="http://schemas.microsoft.com/office/drawing/2010/main" w="9525">
                       <a:solidFill>
                         <a:srgbClr val="000000"/>
                       </a:solidFill>
@@ -27868,7 +27868,7 @@
                 </a:ln>
                 <a:extLst>
                   <a:ext uri="{91240B29-F687-4f45-9708-019B960494DF}">
-                    <a14:hiddenLine xmlns:a14="http://schemas.microsoft.com/office/drawing/2010/main" xmlns="" w="9525">
+                    <a14:hiddenLine xmlns:a14="http://schemas.microsoft.com/office/drawing/2010/main" w="9525">
                       <a:solidFill>
                         <a:srgbClr val="000000"/>
                       </a:solidFill>
@@ -29853,13 +29853,13 @@
   <p:clrMapOvr>
     <a:masterClrMapping/>
   </p:clrMapOvr>
-  <p:transition>
+  <p:transition xmlns:p14="http://schemas.microsoft.com/office/powerpoint/2010/main">
     <p:fade/>
   </p:transition>
   <p:timing>
     <p:tnLst>
       <p:par>
-        <p:cTn id="1" dur="indefinite" restart="never" nodeType="tmRoot">
+        <p:cTn xmlns:p14="http://schemas.microsoft.com/office/powerpoint/2010/main" id="1" dur="indefinite" restart="never" nodeType="tmRoot">
           <p:childTnLst>
             <p:seq concurrent="1" nextAc="seek">
               <p:cTn id="2" dur="indefinite" nodeType="mainSeq">
@@ -30212,14 +30212,12 @@
               <a:rPr lang="en-US" dirty="0" smtClean="0"/>
               <a:t>Exchange Online</a:t>
             </a:r>
-            <a:endParaRPr lang="en-US" dirty="0" smtClean="0"/>
           </a:p>
           <a:p>
             <a:r>
               <a:rPr lang="en-US" dirty="0" smtClean="0"/>
               <a:t>SharePoint Online</a:t>
             </a:r>
-            <a:endParaRPr lang="en-US" dirty="0" smtClean="0"/>
           </a:p>
           <a:p>
             <a:r>
@@ -30232,7 +30230,6 @@
               <a:rPr lang="en-US" dirty="0" smtClean="0"/>
               <a:t>Yammer</a:t>
             </a:r>
-            <a:endParaRPr lang="en-US" dirty="0" smtClean="0"/>
           </a:p>
           <a:p>
             <a:r>
@@ -30300,7 +30297,7 @@
   <p:clrMapOvr>
     <a:masterClrMapping/>
   </p:clrMapOvr>
-  <p:transition>
+  <p:transition xmlns:p14="http://schemas.microsoft.com/office/powerpoint/2010/main">
     <p:fade/>
   </p:transition>
 </p:sld>
@@ -30428,7 +30425,7 @@
   <p:clrMapOvr>
     <a:masterClrMapping/>
   </p:clrMapOvr>
-  <p:transition>
+  <p:transition xmlns:p14="http://schemas.microsoft.com/office/powerpoint/2010/main">
     <p:fade/>
   </p:transition>
 </p:sld>
@@ -30491,7 +30488,7 @@
         </p:nvGraphicFramePr>
         <p:xfrm>
           <a:off x="351383" y="1063255"/>
-          <a:ext cx="11225057" cy="3301434"/>
+          <a:ext cx="11225057" cy="3301433"/>
         </p:xfrm>
         <a:graphic>
           <a:graphicData uri="http://schemas.openxmlformats.org/drawingml/2006/table">
@@ -30503,7 +30500,7 @@
                 <a:gridCol w="11225057">
                   <a:extLst>
                     <a:ext uri="{9D8B030D-6E8A-4147-A177-3AD203B41FA5}">
-                      <a16:colId xmlns:a16="http://schemas.microsoft.com/office/drawing/2014/main" xmlns="" val="1253488153"/>
+                      <a16:colId xmlns="" xmlns:a16="http://schemas.microsoft.com/office/drawing/2014/main" val="1253488153"/>
                     </a:ext>
                   </a:extLst>
                 </a:gridCol>
@@ -30525,7 +30522,7 @@
                 </a:tc>
                 <a:extLst>
                   <a:ext uri="{0D108BD9-81ED-4DB2-BD59-A6C34878D82A}">
-                    <a16:rowId xmlns:a16="http://schemas.microsoft.com/office/drawing/2014/main" xmlns="" val="829859176"/>
+                    <a16:rowId xmlns="" xmlns:a16="http://schemas.microsoft.com/office/drawing/2014/main" val="829859176"/>
                   </a:ext>
                 </a:extLst>
               </a:tr>
@@ -30545,7 +30542,7 @@
                 </a:tc>
                 <a:extLst>
                   <a:ext uri="{0D108BD9-81ED-4DB2-BD59-A6C34878D82A}">
-                    <a16:rowId xmlns:a16="http://schemas.microsoft.com/office/drawing/2014/main" xmlns="" val="1946132611"/>
+                    <a16:rowId xmlns="" xmlns:a16="http://schemas.microsoft.com/office/drawing/2014/main" val="1946132611"/>
                   </a:ext>
                 </a:extLst>
               </a:tr>
@@ -30582,7 +30579,7 @@
                 </a:tc>
                 <a:extLst>
                   <a:ext uri="{0D108BD9-81ED-4DB2-BD59-A6C34878D82A}">
-                    <a16:rowId xmlns:a16="http://schemas.microsoft.com/office/drawing/2014/main" xmlns="" val="3204002662"/>
+                    <a16:rowId xmlns="" xmlns:a16="http://schemas.microsoft.com/office/drawing/2014/main" val="3204002662"/>
                   </a:ext>
                 </a:extLst>
               </a:tr>
@@ -30619,7 +30616,7 @@
                 </a:tc>
                 <a:extLst>
                   <a:ext uri="{0D108BD9-81ED-4DB2-BD59-A6C34878D82A}">
-                    <a16:rowId xmlns:a16="http://schemas.microsoft.com/office/drawing/2014/main" xmlns="" val="4266278162"/>
+                    <a16:rowId xmlns="" xmlns:a16="http://schemas.microsoft.com/office/drawing/2014/main" val="4266278162"/>
                   </a:ext>
                 </a:extLst>
               </a:tr>
@@ -30705,13 +30702,13 @@
   <p:clrMapOvr>
     <a:masterClrMapping/>
   </p:clrMapOvr>
-  <p:transition>
+  <p:transition xmlns:p14="http://schemas.microsoft.com/office/powerpoint/2010/main">
     <p:fade/>
   </p:transition>
   <p:timing>
     <p:tnLst>
       <p:par>
-        <p:cTn id="1" dur="indefinite" restart="never" nodeType="tmRoot"/>
+        <p:cTn xmlns:p14="http://schemas.microsoft.com/office/powerpoint/2010/main" id="1" dur="indefinite" restart="never" nodeType="tmRoot"/>
       </p:par>
     </p:tnLst>
   </p:timing>
@@ -33368,13 +33365,13 @@
   <p:clrMapOvr>
     <a:masterClrMapping/>
   </p:clrMapOvr>
-  <p:transition>
+  <p:transition xmlns:p14="http://schemas.microsoft.com/office/powerpoint/2010/main">
     <p:fade/>
   </p:transition>
   <p:timing>
     <p:tnLst>
       <p:par>
-        <p:cTn id="1" dur="indefinite" restart="never" nodeType="tmRoot"/>
+        <p:cTn xmlns:p14="http://schemas.microsoft.com/office/powerpoint/2010/main" id="1" dur="indefinite" restart="never" nodeType="tmRoot"/>
       </p:par>
     </p:tnLst>
   </p:timing>
@@ -33497,7 +33494,7 @@
   <p:clrMapOvr>
     <a:masterClrMapping/>
   </p:clrMapOvr>
-  <p:transition>
+  <p:transition xmlns:p14="http://schemas.microsoft.com/office/powerpoint/2010/main">
     <p:fade/>
   </p:transition>
 </p:sld>
@@ -33631,7 +33628,7 @@
   <p:clrMapOvr>
     <a:masterClrMapping/>
   </p:clrMapOvr>
-  <p:transition>
+  <p:transition xmlns:p14="http://schemas.microsoft.com/office/powerpoint/2010/main">
     <p:fade/>
   </p:transition>
 </p:sld>
@@ -33735,7 +33732,7 @@
   <p:clrMapOvr>
     <a:masterClrMapping/>
   </p:clrMapOvr>
-  <p:transition>
+  <p:transition xmlns:p14="http://schemas.microsoft.com/office/powerpoint/2010/main">
     <p:fade/>
   </p:transition>
 </p:sld>
@@ -33845,7 +33842,7 @@
   <p:clrMapOvr>
     <a:masterClrMapping/>
   </p:clrMapOvr>
-  <p:transition>
+  <p:transition xmlns:p14="http://schemas.microsoft.com/office/powerpoint/2010/main">
     <p:fade/>
   </p:transition>
 </p:sld>
@@ -33956,7 +33953,7 @@
   <p:clrMapOvr>
     <a:masterClrMapping/>
   </p:clrMapOvr>
-  <p:transition>
+  <p:transition xmlns:p14="http://schemas.microsoft.com/office/powerpoint/2010/main">
     <p:fade/>
   </p:transition>
 </p:sld>
@@ -34014,7 +34011,7 @@
         </p:nvGraphicFramePr>
         <p:xfrm>
           <a:off x="519113" y="1388435"/>
-          <a:ext cx="11463780" cy="2834419"/>
+          <a:ext cx="11463780" cy="2834418"/>
         </p:xfrm>
         <a:graphic>
           <a:graphicData uri="http://schemas.openxmlformats.org/drawingml/2006/table">
@@ -35406,13 +35403,13 @@
   <p:clrMapOvr>
     <a:masterClrMapping/>
   </p:clrMapOvr>
-  <p:transition>
+  <p:transition xmlns:p14="http://schemas.microsoft.com/office/powerpoint/2010/main">
     <p:fade/>
   </p:transition>
   <p:timing>
     <p:tnLst>
       <p:par>
-        <p:cTn id="1" dur="indefinite" restart="never" nodeType="tmRoot"/>
+        <p:cTn xmlns:p14="http://schemas.microsoft.com/office/powerpoint/2010/main" id="1" dur="indefinite" restart="never" nodeType="tmRoot"/>
       </p:par>
     </p:tnLst>
   </p:timing>
@@ -35549,7 +35546,7 @@
   <p:clrMapOvr>
     <a:masterClrMapping/>
   </p:clrMapOvr>
-  <p:transition>
+  <p:transition xmlns:p14="http://schemas.microsoft.com/office/powerpoint/2010/main">
     <p:fade/>
   </p:transition>
 </p:sld>
@@ -35685,7 +35682,7 @@
   <p:clrMapOvr>
     <a:masterClrMapping/>
   </p:clrMapOvr>
-  <p:transition>
+  <p:transition xmlns:p14="http://schemas.microsoft.com/office/powerpoint/2010/main">
     <p:fade/>
   </p:transition>
 </p:sld>
@@ -35819,7 +35816,7 @@
   <p:clrMapOvr>
     <a:masterClrMapping/>
   </p:clrMapOvr>
-  <p:transition>
+  <p:transition xmlns:p14="http://schemas.microsoft.com/office/powerpoint/2010/main">
     <p:fade/>
   </p:transition>
 </p:sld>
@@ -35929,13 +35926,13 @@
   <p:clrMapOvr>
     <a:masterClrMapping/>
   </p:clrMapOvr>
-  <p:transition>
+  <p:transition xmlns:p14="http://schemas.microsoft.com/office/powerpoint/2010/main">
     <p:fade/>
   </p:transition>
   <p:timing>
     <p:tnLst>
       <p:par>
-        <p:cTn id="1" dur="indefinite" restart="never" nodeType="tmRoot"/>
+        <p:cTn xmlns:p14="http://schemas.microsoft.com/office/powerpoint/2010/main" id="1" dur="indefinite" restart="never" nodeType="tmRoot"/>
       </p:par>
     </p:tnLst>
   </p:timing>
@@ -36078,14 +36075,14 @@
   <p:clrMapOvr>
     <a:masterClrMapping/>
   </p:clrMapOvr>
-  <p:transition>
+  <p:transition xmlns:p14="http://schemas.microsoft.com/office/powerpoint/2010/main">
     <p:fade/>
   </p:transition>
 </p:sld>
 </file>
 
 <file path=ppt/slides/slide31.xml><?xml version="1.0" encoding="utf-8"?>
-<p:sld xmlns:a="http://schemas.openxmlformats.org/drawingml/2006/main" xmlns:r="http://schemas.openxmlformats.org/officeDocument/2006/relationships" xmlns:p="http://schemas.openxmlformats.org/presentationml/2006/main">
+<p:sld xmlns:a="http://schemas.openxmlformats.org/drawingml/2006/main" xmlns:r="http://schemas.openxmlformats.org/officeDocument/2006/relationships" xmlns:p="http://schemas.openxmlformats.org/presentationml/2006/main" show="0">
   <p:cSld>
     <p:spTree>
       <p:nvGrpSpPr>
@@ -36160,13 +36157,13 @@
   <p:clrMapOvr>
     <a:masterClrMapping/>
   </p:clrMapOvr>
-  <p:transition>
+  <p:transition xmlns:p14="http://schemas.microsoft.com/office/powerpoint/2010/main">
     <p:fade/>
   </p:transition>
   <p:timing>
     <p:tnLst>
       <p:par>
-        <p:cTn id="1" dur="indefinite" restart="never" nodeType="tmRoot"/>
+        <p:cTn xmlns:p14="http://schemas.microsoft.com/office/powerpoint/2010/main" id="1" dur="indefinite" restart="never" nodeType="tmRoot"/>
       </p:par>
     </p:tnLst>
   </p:timing>
@@ -36309,7 +36306,7 @@
   <p:timing>
     <p:tnLst>
       <p:par>
-        <p:cTn id="1" dur="indefinite" restart="never" nodeType="tmRoot"/>
+        <p:cTn xmlns:p14="http://schemas.microsoft.com/office/powerpoint/2010/main" id="1" dur="indefinite" restart="never" nodeType="tmRoot"/>
       </p:par>
     </p:tnLst>
   </p:timing>
@@ -36694,7 +36691,7 @@
   <p:timing>
     <p:tnLst>
       <p:par>
-        <p:cTn id="1" dur="indefinite" restart="never" nodeType="tmRoot"/>
+        <p:cTn xmlns:p14="http://schemas.microsoft.com/office/powerpoint/2010/main" id="1" dur="indefinite" restart="never" nodeType="tmRoot"/>
       </p:par>
     </p:tnLst>
   </p:timing>
@@ -36837,7 +36834,7 @@
   <p:timing>
     <p:tnLst>
       <p:par>
-        <p:cTn id="1" dur="indefinite" restart="never" nodeType="tmRoot"/>
+        <p:cTn xmlns:p14="http://schemas.microsoft.com/office/powerpoint/2010/main" id="1" dur="indefinite" restart="never" nodeType="tmRoot"/>
       </p:par>
     </p:tnLst>
   </p:timing>
@@ -36914,13 +36911,13 @@
   <p:clrMapOvr>
     <a:masterClrMapping/>
   </p:clrMapOvr>
-  <p:transition>
+  <p:transition xmlns:p14="http://schemas.microsoft.com/office/powerpoint/2010/main">
     <p:fade/>
   </p:transition>
   <p:timing>
     <p:tnLst>
       <p:par>
-        <p:cTn id="1" dur="indefinite" restart="never" nodeType="tmRoot"/>
+        <p:cTn xmlns:p14="http://schemas.microsoft.com/office/powerpoint/2010/main" id="1" dur="indefinite" restart="never" nodeType="tmRoot"/>
       </p:par>
     </p:tnLst>
   </p:timing>
@@ -37056,7 +37053,7 @@
   <p:clrMapOvr>
     <a:masterClrMapping/>
   </p:clrMapOvr>
-  <p:transition>
+  <p:transition xmlns:p14="http://schemas.microsoft.com/office/powerpoint/2010/main">
     <p:fade/>
   </p:transition>
 </p:sld>
@@ -37176,7 +37173,7 @@
   <p:clrMapOvr>
     <a:masterClrMapping/>
   </p:clrMapOvr>
-  <p:transition>
+  <p:transition xmlns:p14="http://schemas.microsoft.com/office/powerpoint/2010/main">
     <p:fade/>
   </p:transition>
 </p:sld>
@@ -37296,7 +37293,7 @@
   <p:clrMapOvr>
     <a:masterClrMapping/>
   </p:clrMapOvr>
-  <p:transition>
+  <p:transition xmlns:p14="http://schemas.microsoft.com/office/powerpoint/2010/main">
     <p:fade/>
   </p:transition>
 </p:sld>
@@ -37548,7 +37545,7 @@
   <p:clrMapOvr>
     <a:masterClrMapping/>
   </p:clrMapOvr>
-  <p:transition>
+  <p:transition xmlns:p14="http://schemas.microsoft.com/office/powerpoint/2010/main">
     <p:fade/>
   </p:transition>
 </p:sld>
@@ -37841,7 +37838,7 @@
   <a:extraClrSchemeLst/>
   <a:extLst>
     <a:ext uri="{05A4C25C-085E-4340-85A3-A5531E510DB2}">
-      <thm15:themeFamily xmlns:thm15="http://schemas.microsoft.com/office/thememl/2012/main" name="Office_Template_16x9_WHITE.potx" id="{BAC85760-2BE3-4369-8D6A-792FA239637A}" vid="{0B6ECECE-D832-4A6D-9382-4D4E764C03DC}"/>
+      <thm15:themeFamily xmlns:thm15="http://schemas.microsoft.com/office/thememl/2012/main" xmlns="" name="Office_Template_16x9_WHITE.potx" id="{BAC85760-2BE3-4369-8D6A-792FA239637A}" vid="{0B6ECECE-D832-4A6D-9382-4D4E764C03DC}"/>
     </a:ext>
   </a:extLst>
 </a:theme>
@@ -38134,7 +38131,7 @@
   <a:extraClrSchemeLst/>
   <a:extLst>
     <a:ext uri="{05A4C25C-085E-4340-85A3-A5531E510DB2}">
-      <thm15:themeFamily xmlns:thm15="http://schemas.microsoft.com/office/thememl/2012/main" name="Office_Template_16x9_WHITE.potx" id="{BAC85760-2BE3-4369-8D6A-792FA239637A}" vid="{A93E73D1-45C6-4FF9-A009-9C9E7F69F4DC}"/>
+      <thm15:themeFamily xmlns:thm15="http://schemas.microsoft.com/office/thememl/2012/main" xmlns="" name="Office_Template_16x9_WHITE.potx" id="{BAC85760-2BE3-4369-8D6A-792FA239637A}" vid="{A93E73D1-45C6-4FF9-A009-9C9E7F69F4DC}"/>
     </a:ext>
   </a:extLst>
 </a:theme>

</xml_diff>

<commit_message>
renamed m3 to "hook" from "hooking" to standardize across all modules
</commit_message>
<xml_diff>
--- a/02.Setting up the Environments/02.Setting up the Environments.pptx
+++ b/02.Setting up the Environments/02.Setting up the Environments.pptx
@@ -145,7 +145,7 @@
   </p:defaultTextStyle>
   <p:extLst>
     <p:ext uri="{EFAFB233-063F-42B5-8137-9DF3F51BA10A}">
-      <p15:sldGuideLst xmlns:p15="http://schemas.microsoft.com/office/powerpoint/2012/main" xmlns="">
+      <p15:sldGuideLst xmlns="" xmlns:p15="http://schemas.microsoft.com/office/powerpoint/2012/main">
         <p15:guide id="1" orient="horz" pos="142">
           <p15:clr>
             <a:srgbClr val="A4A3A4"/>
@@ -244,7 +244,7 @@
       </p15:sldGuideLst>
     </p:ext>
     <p:ext uri="{2D200454-40CA-4A62-9FC3-DE9A4176ACB9}">
-      <p15:notesGuideLst xmlns:p15="http://schemas.microsoft.com/office/powerpoint/2012/main" xmlns="">
+      <p15:notesGuideLst xmlns="" xmlns:p15="http://schemas.microsoft.com/office/powerpoint/2012/main">
         <p15:guide id="1" orient="horz" pos="2880">
           <p15:clr>
             <a:srgbClr val="A4A3A4"/>
@@ -347,7 +347,7 @@
           <a:p>
             <a:fld id="{DE219B1A-AE41-483B-A766-69B9363DDA6A}" type="datetimeFigureOut">
               <a:rPr lang="en-US" smtClean="0"/>
-              <a:t>9/9/14</a:t>
+              <a:t>9/10/14</a:t>
             </a:fld>
             <a:endParaRPr lang="en-US"/>
           </a:p>
@@ -629,7 +629,7 @@
           <a:p>
             <a:fld id="{D51B1278-D92B-4AF3-A9C1-71DD298190CE}" type="datetimeFigureOut">
               <a:rPr lang="en-US" smtClean="0"/>
-              <a:t>9/9/14</a:t>
+              <a:t>9/10/14</a:t>
             </a:fld>
             <a:endParaRPr lang="en-US"/>
           </a:p>
@@ -1224,7 +1224,7 @@
           <a:p>
             <a:fld id="{4F0210BE-2A39-4D0E-9359-F64D4B884D4E}" type="datetime1">
               <a:rPr lang="en-US" smtClean="0"/>
-              <a:t>9/9/14</a:t>
+              <a:t>9/10/14</a:t>
             </a:fld>
             <a:endParaRPr lang="en-US"/>
           </a:p>
@@ -1434,7 +1434,7 @@
           <a:p>
             <a:fld id="{CA454356-7988-4E39-B534-EC35F7CCC11C}" type="datetime1">
               <a:rPr lang="en-US" smtClean="0"/>
-              <a:t>9/9/14</a:t>
+              <a:t>9/10/14</a:t>
             </a:fld>
             <a:endParaRPr lang="en-US"/>
           </a:p>
@@ -1640,7 +1640,7 @@
           <a:p>
             <a:fld id="{1B816852-F550-4F1E-AE22-5580BB5390CD}" type="datetime1">
               <a:rPr lang="en-US" smtClean="0"/>
-              <a:t>9/9/14</a:t>
+              <a:t>9/10/14</a:t>
             </a:fld>
             <a:endParaRPr lang="en-US"/>
           </a:p>
@@ -1850,7 +1850,7 @@
           <a:p>
             <a:fld id="{8C3D3F17-9065-4B2A-80EA-09A3A0159250}" type="datetime1">
               <a:rPr lang="en-US" smtClean="0"/>
-              <a:t>9/9/14</a:t>
+              <a:t>9/10/14</a:t>
             </a:fld>
             <a:endParaRPr lang="en-US"/>
           </a:p>
@@ -2167,7 +2167,7 @@
           <a:p>
             <a:fld id="{E94FB22D-AF06-49F0-ABFB-4A3B32E04FBE}" type="datetime1">
               <a:rPr lang="en-US" smtClean="0"/>
-              <a:t>9/9/14</a:t>
+              <a:t>9/10/14</a:t>
             </a:fld>
             <a:endParaRPr lang="en-US"/>
           </a:p>
@@ -2274,7 +2274,7 @@
           <a:p>
             <a:fld id="{35A2105E-80AA-4B38-BA9C-D7E35197D8BA}" type="datetime1">
               <a:rPr lang="en-US" smtClean="0"/>
-              <a:t>9/9/14</a:t>
+              <a:t>9/10/14</a:t>
             </a:fld>
             <a:endParaRPr lang="en-US"/>
           </a:p>
@@ -2480,7 +2480,7 @@
           <a:p>
             <a:fld id="{C5A2A3EB-BE87-4080-97A4-5341D2051EE4}" type="datetime1">
               <a:rPr lang="en-US" smtClean="0"/>
-              <a:t>9/9/14</a:t>
+              <a:t>9/10/14</a:t>
             </a:fld>
             <a:endParaRPr lang="en-US"/>
           </a:p>
@@ -2837,7 +2837,7 @@
           <a:p>
             <a:fld id="{B079C3B8-7366-4A44-A34B-3977080C19E7}" type="datetime1">
               <a:rPr lang="en-US" smtClean="0"/>
-              <a:t>9/9/14</a:t>
+              <a:t>9/10/14</a:t>
             </a:fld>
             <a:endParaRPr lang="en-US" dirty="0"/>
           </a:p>
@@ -3079,7 +3079,7 @@
           <a:p>
             <a:fld id="{0BB6559B-C68D-49B4-97AE-9BB74C417927}" type="datetime1">
               <a:rPr lang="en-US" smtClean="0"/>
-              <a:t>9/9/14</a:t>
+              <a:t>9/10/14</a:t>
             </a:fld>
             <a:endParaRPr lang="en-US"/>
           </a:p>
@@ -3337,7 +3337,7 @@
           <a:p>
             <a:fld id="{B079C3B8-7366-4A44-A34B-3977080C19E7}" type="datetime1">
               <a:rPr lang="en-US" smtClean="0"/>
-              <a:t>9/9/14</a:t>
+              <a:t>9/10/14</a:t>
             </a:fld>
             <a:endParaRPr lang="en-US" dirty="0"/>
           </a:p>
@@ -3468,7 +3468,7 @@
           <a:p>
             <a:fld id="{9A443B04-064F-4871-9D9F-BDCA414B0371}" type="datetime1">
               <a:rPr lang="en-US" smtClean="0"/>
-              <a:t>9/9/14</a:t>
+              <a:t>9/10/14</a:t>
             </a:fld>
             <a:endParaRPr lang="en-US"/>
           </a:p>
@@ -3705,7 +3705,7 @@
           <a:p>
             <a:fld id="{7017412A-FAE9-499A-B3C7-924D02AB998D}" type="datetime1">
               <a:rPr lang="en-US" smtClean="0"/>
-              <a:t>9/9/14</a:t>
+              <a:t>9/10/14</a:t>
             </a:fld>
             <a:endParaRPr lang="en-US"/>
           </a:p>
@@ -3917,7 +3917,7 @@
           <a:p>
             <a:fld id="{4692986F-2699-409F-8A21-4F1A3E24BE62}" type="datetime1">
               <a:rPr lang="en-US" smtClean="0"/>
-              <a:t>9/9/14</a:t>
+              <a:t>9/10/14</a:t>
             </a:fld>
             <a:endParaRPr lang="en-US"/>
           </a:p>
@@ -4149,7 +4149,7 @@
           <a:p>
             <a:fld id="{EC07A5DE-1429-409E-95F7-F13CDA16C6E2}" type="datetime1">
               <a:rPr lang="en-US" smtClean="0"/>
-              <a:t>9/9/14</a:t>
+              <a:t>9/10/14</a:t>
             </a:fld>
             <a:endParaRPr lang="en-US"/>
           </a:p>
@@ -4373,7 +4373,7 @@
           <a:p>
             <a:fld id="{BBA7F52A-B8F7-43B0-8B42-741D53CB577A}" type="datetime1">
               <a:rPr lang="en-US" smtClean="0"/>
-              <a:t>9/9/14</a:t>
+              <a:t>9/10/14</a:t>
             </a:fld>
             <a:endParaRPr lang="en-US"/>
           </a:p>
@@ -4589,7 +4589,7 @@
           <a:p>
             <a:fld id="{4B1490A0-601F-404D-B7DA-4F4F3A8C8BB1}" type="datetime1">
               <a:rPr lang="en-US" smtClean="0"/>
-              <a:t>9/9/14</a:t>
+              <a:t>9/10/14</a:t>
             </a:fld>
             <a:endParaRPr lang="en-US"/>
           </a:p>
@@ -9161,7 +9161,7 @@
   </p:timing>
   <p:extLst mod="1">
     <p:ext uri="{DCECCB84-F9BA-43D5-87BE-67443E8EF086}">
-      <p15:sldGuideLst xmlns:p15="http://schemas.microsoft.com/office/powerpoint/2012/main" xmlns="">
+      <p15:sldGuideLst xmlns="" xmlns:p15="http://schemas.microsoft.com/office/powerpoint/2012/main">
         <p15:guide id="1" orient="horz" pos="2203">
           <p15:clr>
             <a:srgbClr val="FBAE40"/>
@@ -30481,7 +30481,7 @@
             <p:ph sz="quarter" idx="10"/>
             <p:extLst>
               <p:ext uri="{D42A27DB-BD31-4B8C-83A1-F6EECF244321}">
-                <p14:modId xmlns:p14="http://schemas.microsoft.com/office/powerpoint/2010/main" val="3663320048"/>
+                <p14:modId xmlns:p14="http://schemas.microsoft.com/office/powerpoint/2010/main" val="2826759016"/>
               </p:ext>
             </p:extLst>
           </p:nvPr>
@@ -30500,7 +30500,7 @@
                 <a:gridCol w="11225057">
                   <a:extLst>
                     <a:ext uri="{9D8B030D-6E8A-4147-A177-3AD203B41FA5}">
-                      <a16:colId xmlns="" xmlns:a16="http://schemas.microsoft.com/office/drawing/2014/main" val="1253488153"/>
+                      <a16:colId xmlns:a16="http://schemas.microsoft.com/office/drawing/2014/main" xmlns="" val="1253488153"/>
                     </a:ext>
                   </a:extLst>
                 </a:gridCol>
@@ -30522,7 +30522,7 @@
                 </a:tc>
                 <a:extLst>
                   <a:ext uri="{0D108BD9-81ED-4DB2-BD59-A6C34878D82A}">
-                    <a16:rowId xmlns="" xmlns:a16="http://schemas.microsoft.com/office/drawing/2014/main" val="829859176"/>
+                    <a16:rowId xmlns:a16="http://schemas.microsoft.com/office/drawing/2014/main" xmlns="" val="829859176"/>
                   </a:ext>
                 </a:extLst>
               </a:tr>
@@ -30542,7 +30542,7 @@
                 </a:tc>
                 <a:extLst>
                   <a:ext uri="{0D108BD9-81ED-4DB2-BD59-A6C34878D82A}">
-                    <a16:rowId xmlns="" xmlns:a16="http://schemas.microsoft.com/office/drawing/2014/main" val="1946132611"/>
+                    <a16:rowId xmlns:a16="http://schemas.microsoft.com/office/drawing/2014/main" xmlns="" val="1946132611"/>
                   </a:ext>
                 </a:extLst>
               </a:tr>
@@ -30579,7 +30579,7 @@
                 </a:tc>
                 <a:extLst>
                   <a:ext uri="{0D108BD9-81ED-4DB2-BD59-A6C34878D82A}">
-                    <a16:rowId xmlns="" xmlns:a16="http://schemas.microsoft.com/office/drawing/2014/main" val="3204002662"/>
+                    <a16:rowId xmlns:a16="http://schemas.microsoft.com/office/drawing/2014/main" xmlns="" val="3204002662"/>
                   </a:ext>
                 </a:extLst>
               </a:tr>
@@ -30608,7 +30608,15 @@
                       </a:pPr>
                       <a:r>
                         <a:rPr lang="en-US" sz="2400" dirty="0" smtClean="0"/>
-                        <a:t>Module 3: Hooking into Apps for SharePoint</a:t>
+                        <a:t>Module 3: </a:t>
+                      </a:r>
+                      <a:r>
+                        <a:rPr lang="en-US" sz="2400" dirty="0" smtClean="0"/>
+                        <a:t>Hook </a:t>
+                      </a:r>
+                      <a:r>
+                        <a:rPr lang="en-US" sz="2400" dirty="0" smtClean="0"/>
+                        <a:t>into Apps for SharePoint</a:t>
                       </a:r>
                     </a:p>
                   </a:txBody>
@@ -30616,7 +30624,7 @@
                 </a:tc>
                 <a:extLst>
                   <a:ext uri="{0D108BD9-81ED-4DB2-BD59-A6C34878D82A}">
-                    <a16:rowId xmlns="" xmlns:a16="http://schemas.microsoft.com/office/drawing/2014/main" val="4266278162"/>
+                    <a16:rowId xmlns:a16="http://schemas.microsoft.com/office/drawing/2014/main" xmlns="" val="4266278162"/>
                   </a:ext>
                 </a:extLst>
               </a:tr>
@@ -30649,7 +30657,11 @@
                       </a:r>
                       <a:r>
                         <a:rPr lang="en-US" sz="2400" dirty="0" smtClean="0"/>
-                        <a:t>Hooking into Office 365 and SharePoint APIs with SPAs</a:t>
+                        <a:t>Hook </a:t>
+                      </a:r>
+                      <a:r>
+                        <a:rPr lang="en-US" sz="2400" dirty="0" smtClean="0"/>
+                        <a:t>into Office 365 and SharePoint APIs with SPAs</a:t>
                       </a:r>
                     </a:p>
                   </a:txBody>
@@ -30681,7 +30693,15 @@
                       </a:pPr>
                       <a:r>
                         <a:rPr lang="en-US" sz="2400" b="0" dirty="0" smtClean="0"/>
-                        <a:t>Module 5: Hooking into Apps for Office</a:t>
+                        <a:t>Module 5: </a:t>
+                      </a:r>
+                      <a:r>
+                        <a:rPr lang="en-US" sz="2400" b="0" dirty="0" smtClean="0"/>
+                        <a:t>Hook </a:t>
+                      </a:r>
+                      <a:r>
+                        <a:rPr lang="en-US" sz="2400" b="0" dirty="0" smtClean="0"/>
+                        <a:t>into Apps for Office</a:t>
                       </a:r>
                     </a:p>
                   </a:txBody>
@@ -37838,7 +37858,7 @@
   <a:extraClrSchemeLst/>
   <a:extLst>
     <a:ext uri="{05A4C25C-085E-4340-85A3-A5531E510DB2}">
-      <thm15:themeFamily xmlns:thm15="http://schemas.microsoft.com/office/thememl/2012/main" xmlns="" name="Office_Template_16x9_WHITE.potx" id="{BAC85760-2BE3-4369-8D6A-792FA239637A}" vid="{0B6ECECE-D832-4A6D-9382-4D4E764C03DC}"/>
+      <thm15:themeFamily xmlns="" xmlns:thm15="http://schemas.microsoft.com/office/thememl/2012/main" name="Office_Template_16x9_WHITE.potx" id="{BAC85760-2BE3-4369-8D6A-792FA239637A}" vid="{0B6ECECE-D832-4A6D-9382-4D4E764C03DC}"/>
     </a:ext>
   </a:extLst>
 </a:theme>
@@ -38131,7 +38151,7 @@
   <a:extraClrSchemeLst/>
   <a:extLst>
     <a:ext uri="{05A4C25C-085E-4340-85A3-A5531E510DB2}">
-      <thm15:themeFamily xmlns:thm15="http://schemas.microsoft.com/office/thememl/2012/main" xmlns="" name="Office_Template_16x9_WHITE.potx" id="{BAC85760-2BE3-4369-8D6A-792FA239637A}" vid="{A93E73D1-45C6-4FF9-A009-9C9E7F69F4DC}"/>
+      <thm15:themeFamily xmlns="" xmlns:thm15="http://schemas.microsoft.com/office/thememl/2012/main" name="Office_Template_16x9_WHITE.potx" id="{BAC85760-2BE3-4369-8D6A-792FA239637A}" vid="{A93E73D1-45C6-4FF9-A009-9C9E7F69F4DC}"/>
     </a:ext>
   </a:extLst>
 </a:theme>

</xml_diff>

<commit_message>
standardized slide formatting with sections
</commit_message>
<xml_diff>
--- a/02.Setting up the Environments/02.Setting up the Environments.pptx
+++ b/02.Setting up the Environments/02.Setting up the Environments.pptx
@@ -144,8 +144,65 @@
     </a:lvl9pPr>
   </p:defaultTextStyle>
   <p:extLst>
+    <p:ext uri="{521415D9-36F7-43E2-AB2F-B90AF26B5E84}">
+      <p14:sectionLst xmlns:p14="http://schemas.microsoft.com/office/powerpoint/2010/main">
+        <p14:section name="Overview" id="{C6104F23-DA87-5249-96ED-8242B7341074}">
+          <p14:sldIdLst>
+            <p14:sldId id="780"/>
+            <p14:sldId id="781"/>
+            <p14:sldId id="782"/>
+            <p14:sldId id="779"/>
+          </p14:sldIdLst>
+        </p14:section>
+        <p14:section name="The Office 365 Environment" id="{27707372-2A62-F941-A931-33D7D4E757A7}">
+          <p14:sldIdLst>
+            <p14:sldId id="784"/>
+            <p14:sldId id="812"/>
+            <p14:sldId id="813"/>
+            <p14:sldId id="814"/>
+            <p14:sldId id="815"/>
+            <p14:sldId id="810"/>
+          </p14:sldIdLst>
+        </p14:section>
+        <p14:section name="The Microsoft Azure Environment" id="{C9B42F59-B711-1141-B363-11DD928C7AC0}">
+          <p14:sldIdLst>
+            <p14:sldId id="785"/>
+            <p14:sldId id="816"/>
+            <p14:sldId id="817"/>
+            <p14:sldId id="818"/>
+            <p14:sldId id="811"/>
+          </p14:sldIdLst>
+        </p14:section>
+        <p14:section name="App Development Overview" id="{0ED51F39-92E5-554B-AFCD-1B1BE0163CC6}">
+          <p14:sldIdLst>
+            <p14:sldId id="826"/>
+            <p14:sldId id="827"/>
+            <p14:sldId id="828"/>
+            <p14:sldId id="829"/>
+            <p14:sldId id="830"/>
+            <p14:sldId id="831"/>
+            <p14:sldId id="832"/>
+            <p14:sldId id="833"/>
+            <p14:sldId id="841"/>
+            <p14:sldId id="834"/>
+            <p14:sldId id="835"/>
+            <p14:sldId id="836"/>
+            <p14:sldId id="837"/>
+            <p14:sldId id="838"/>
+            <p14:sldId id="839"/>
+            <p14:sldId id="840"/>
+          </p14:sldIdLst>
+        </p14:section>
+        <p14:section name="Summary" id="{7B3346DA-80A3-D648-8F1D-9F4982F9CF42}">
+          <p14:sldIdLst>
+            <p14:sldId id="825"/>
+            <p14:sldId id="654"/>
+          </p14:sldIdLst>
+        </p14:section>
+      </p14:sectionLst>
+    </p:ext>
     <p:ext uri="{EFAFB233-063F-42B5-8137-9DF3F51BA10A}">
-      <p15:sldGuideLst xmlns="" xmlns:p15="http://schemas.microsoft.com/office/powerpoint/2012/main">
+      <p15:sldGuideLst xmlns:p15="http://schemas.microsoft.com/office/powerpoint/2012/main" xmlns="">
         <p15:guide id="1" orient="horz" pos="142">
           <p15:clr>
             <a:srgbClr val="A4A3A4"/>
@@ -244,7 +301,7 @@
       </p15:sldGuideLst>
     </p:ext>
     <p:ext uri="{2D200454-40CA-4A62-9FC3-DE9A4176ACB9}">
-      <p15:notesGuideLst xmlns="" xmlns:p15="http://schemas.microsoft.com/office/powerpoint/2012/main">
+      <p15:notesGuideLst xmlns:p15="http://schemas.microsoft.com/office/powerpoint/2012/main" xmlns="">
         <p15:guide id="1" orient="horz" pos="2880">
           <p15:clr>
             <a:srgbClr val="A4A3A4"/>
@@ -9161,7 +9218,7 @@
   </p:timing>
   <p:extLst mod="1">
     <p:ext uri="{DCECCB84-F9BA-43D5-87BE-67443E8EF086}">
-      <p15:sldGuideLst xmlns="" xmlns:p15="http://schemas.microsoft.com/office/powerpoint/2012/main">
+      <p15:sldGuideLst xmlns:p15="http://schemas.microsoft.com/office/powerpoint/2012/main" xmlns="">
         <p15:guide id="1" orient="horz" pos="2203">
           <p15:clr>
             <a:srgbClr val="FBAE40"/>
@@ -15570,7 +15627,15 @@
           <a:p>
             <a:r>
               <a:rPr lang="en-US" dirty="0" smtClean="0"/>
-              <a:t>The Windows Azure Environment</a:t>
+              <a:t>The </a:t>
+            </a:r>
+            <a:r>
+              <a:rPr lang="en-US" dirty="0" smtClean="0"/>
+              <a:t>Microsoft Azure </a:t>
+            </a:r>
+            <a:r>
+              <a:rPr lang="en-US" dirty="0" smtClean="0"/>
+              <a:t>Environment</a:t>
             </a:r>
             <a:endParaRPr lang="en-US" dirty="0"/>
           </a:p>
@@ -15734,7 +15799,7 @@
         </p:blipFill>
         <p:spPr>
           <a:xfrm>
-            <a:off x="2010687" y="3131829"/>
+            <a:off x="3575063" y="3504981"/>
             <a:ext cx="5038699" cy="3267728"/>
           </a:xfrm>
           <a:prstGeom prst="rect">
@@ -30500,7 +30565,7 @@
                 <a:gridCol w="11225057">
                   <a:extLst>
                     <a:ext uri="{9D8B030D-6E8A-4147-A177-3AD203B41FA5}">
-                      <a16:colId xmlns:a16="http://schemas.microsoft.com/office/drawing/2014/main" xmlns="" val="1253488153"/>
+                      <a16:colId xmlns="" xmlns:a16="http://schemas.microsoft.com/office/drawing/2014/main" val="1253488153"/>
                     </a:ext>
                   </a:extLst>
                 </a:gridCol>
@@ -30522,7 +30587,7 @@
                 </a:tc>
                 <a:extLst>
                   <a:ext uri="{0D108BD9-81ED-4DB2-BD59-A6C34878D82A}">
-                    <a16:rowId xmlns:a16="http://schemas.microsoft.com/office/drawing/2014/main" xmlns="" val="829859176"/>
+                    <a16:rowId xmlns="" xmlns:a16="http://schemas.microsoft.com/office/drawing/2014/main" val="829859176"/>
                   </a:ext>
                 </a:extLst>
               </a:tr>
@@ -30542,7 +30607,7 @@
                 </a:tc>
                 <a:extLst>
                   <a:ext uri="{0D108BD9-81ED-4DB2-BD59-A6C34878D82A}">
-                    <a16:rowId xmlns:a16="http://schemas.microsoft.com/office/drawing/2014/main" xmlns="" val="1946132611"/>
+                    <a16:rowId xmlns="" xmlns:a16="http://schemas.microsoft.com/office/drawing/2014/main" val="1946132611"/>
                   </a:ext>
                 </a:extLst>
               </a:tr>
@@ -30579,7 +30644,7 @@
                 </a:tc>
                 <a:extLst>
                   <a:ext uri="{0D108BD9-81ED-4DB2-BD59-A6C34878D82A}">
-                    <a16:rowId xmlns:a16="http://schemas.microsoft.com/office/drawing/2014/main" xmlns="" val="3204002662"/>
+                    <a16:rowId xmlns="" xmlns:a16="http://schemas.microsoft.com/office/drawing/2014/main" val="3204002662"/>
                   </a:ext>
                 </a:extLst>
               </a:tr>
@@ -30608,15 +30673,7 @@
                       </a:pPr>
                       <a:r>
                         <a:rPr lang="en-US" sz="2400" dirty="0" smtClean="0"/>
-                        <a:t>Module 3: </a:t>
-                      </a:r>
-                      <a:r>
-                        <a:rPr lang="en-US" sz="2400" dirty="0" smtClean="0"/>
-                        <a:t>Hook </a:t>
-                      </a:r>
-                      <a:r>
-                        <a:rPr lang="en-US" sz="2400" dirty="0" smtClean="0"/>
-                        <a:t>into Apps for SharePoint</a:t>
+                        <a:t>Module 3: Hook into Apps for SharePoint</a:t>
                       </a:r>
                     </a:p>
                   </a:txBody>
@@ -30624,7 +30681,7 @@
                 </a:tc>
                 <a:extLst>
                   <a:ext uri="{0D108BD9-81ED-4DB2-BD59-A6C34878D82A}">
-                    <a16:rowId xmlns:a16="http://schemas.microsoft.com/office/drawing/2014/main" xmlns="" val="4266278162"/>
+                    <a16:rowId xmlns="" xmlns:a16="http://schemas.microsoft.com/office/drawing/2014/main" val="4266278162"/>
                   </a:ext>
                 </a:extLst>
               </a:tr>
@@ -30657,11 +30714,7 @@
                       </a:r>
                       <a:r>
                         <a:rPr lang="en-US" sz="2400" dirty="0" smtClean="0"/>
-                        <a:t>Hook </a:t>
-                      </a:r>
-                      <a:r>
-                        <a:rPr lang="en-US" sz="2400" dirty="0" smtClean="0"/>
-                        <a:t>into Office 365 and SharePoint APIs with SPAs</a:t>
+                        <a:t>Hook into Office 365 and SharePoint APIs with SPAs</a:t>
                       </a:r>
                     </a:p>
                   </a:txBody>
@@ -30693,15 +30746,7 @@
                       </a:pPr>
                       <a:r>
                         <a:rPr lang="en-US" sz="2400" b="0" dirty="0" smtClean="0"/>
-                        <a:t>Module 5: </a:t>
-                      </a:r>
-                      <a:r>
-                        <a:rPr lang="en-US" sz="2400" b="0" dirty="0" smtClean="0"/>
-                        <a:t>Hook </a:t>
-                      </a:r>
-                      <a:r>
-                        <a:rPr lang="en-US" sz="2400" b="0" dirty="0" smtClean="0"/>
-                        <a:t>into Apps for Office</a:t>
+                        <a:t>Module 5: Hook into Apps for Office</a:t>
                       </a:r>
                     </a:p>
                   </a:txBody>
@@ -36763,7 +36808,15 @@
           <a:p>
             <a:r>
               <a:rPr lang="en-US" dirty="0" smtClean="0"/>
-              <a:t>The Windows Azure Environment</a:t>
+              <a:t>The </a:t>
+            </a:r>
+            <a:r>
+              <a:rPr lang="en-US" dirty="0" smtClean="0"/>
+              <a:t>Microsoft Azure </a:t>
+            </a:r>
+            <a:r>
+              <a:rPr lang="en-US" dirty="0" smtClean="0"/>
+              <a:t>Environment</a:t>
             </a:r>
           </a:p>
           <a:p>
@@ -37858,7 +37911,7 @@
   <a:extraClrSchemeLst/>
   <a:extLst>
     <a:ext uri="{05A4C25C-085E-4340-85A3-A5531E510DB2}">
-      <thm15:themeFamily xmlns="" xmlns:thm15="http://schemas.microsoft.com/office/thememl/2012/main" name="Office_Template_16x9_WHITE.potx" id="{BAC85760-2BE3-4369-8D6A-792FA239637A}" vid="{0B6ECECE-D832-4A6D-9382-4D4E764C03DC}"/>
+      <thm15:themeFamily xmlns:thm15="http://schemas.microsoft.com/office/thememl/2012/main" xmlns="" name="Office_Template_16x9_WHITE.potx" id="{BAC85760-2BE3-4369-8D6A-792FA239637A}" vid="{0B6ECECE-D832-4A6D-9382-4D4E764C03DC}"/>
     </a:ext>
   </a:extLst>
 </a:theme>
@@ -38151,7 +38204,7 @@
   <a:extraClrSchemeLst/>
   <a:extLst>
     <a:ext uri="{05A4C25C-085E-4340-85A3-A5531E510DB2}">
-      <thm15:themeFamily xmlns="" xmlns:thm15="http://schemas.microsoft.com/office/thememl/2012/main" name="Office_Template_16x9_WHITE.potx" id="{BAC85760-2BE3-4369-8D6A-792FA239637A}" vid="{A93E73D1-45C6-4FF9-A009-9C9E7F69F4DC}"/>
+      <thm15:themeFamily xmlns:thm15="http://schemas.microsoft.com/office/thememl/2012/main" xmlns="" name="Office_Template_16x9_WHITE.potx" id="{BAC85760-2BE3-4369-8D6A-792FA239637A}" vid="{A93E73D1-45C6-4FF9-A009-9C9E7F69F4DC}"/>
     </a:ext>
   </a:extLst>
 </a:theme>

</xml_diff>